<commit_message>
add new course material for sociology
</commit_message>
<xml_diff>
--- a/intro-to-sociology/course-material/Sociology and its emergence.pptx
+++ b/intro-to-sociology/course-material/Sociology and its emergence.pptx
@@ -8736,18 +8736,36 @@
 </file>
 
 <file path=customXml/item1.xml><?xml version="1.0" encoding="utf-8"?>
-<ct:contentTypeSchema xmlns:ct="http://schemas.microsoft.com/office/2006/metadata/contentType" xmlns:ma="http://schemas.microsoft.com/office/2006/metadata/properties/metaAttributes" ct:_="" ma:_="" ma:contentTypeName="Document" ma:contentTypeID="0x010100FFCB62BDE5797842B3E8F4DFDEE5EC14" ma:contentTypeVersion="0" ma:contentTypeDescription="Create a new document." ma:contentTypeScope="" ma:versionID="64e67c81c5d3765e1860219bd79f9ba2">
-  <xsd:schema xmlns:xsd="http://www.w3.org/2001/XMLSchema" xmlns:xs="http://www.w3.org/2001/XMLSchema" xmlns:p="http://schemas.microsoft.com/office/2006/metadata/properties" targetNamespace="http://schemas.microsoft.com/office/2006/metadata/properties" ma:root="true" ma:fieldsID="0967b7be50301903c78f9c39c6fd9af8">
+<ct:contentTypeSchema xmlns:ct="http://schemas.microsoft.com/office/2006/metadata/contentType" xmlns:ma="http://schemas.microsoft.com/office/2006/metadata/properties/metaAttributes" ct:_="" ma:_="" ma:contentTypeName="Document" ma:contentTypeID="0x010100FFCB62BDE5797842B3E8F4DFDEE5EC14" ma:contentTypeVersion="2" ma:contentTypeDescription="Create a new document." ma:contentTypeScope="" ma:versionID="a421b20cc2fb01e6bdf9eca8661a6437">
+  <xsd:schema xmlns:xsd="http://www.w3.org/2001/XMLSchema" xmlns:xs="http://www.w3.org/2001/XMLSchema" xmlns:p="http://schemas.microsoft.com/office/2006/metadata/properties" xmlns:ns2="35490fb0-488e-45f4-b3a6-635ff1ba56af" targetNamespace="http://schemas.microsoft.com/office/2006/metadata/properties" ma:root="true" ma:fieldsID="118277de2ff41ddf6288902fdd188c2e" ns2:_="">
+    <xsd:import namespace="35490fb0-488e-45f4-b3a6-635ff1ba56af"/>
     <xsd:element name="properties">
       <xsd:complexType>
         <xsd:sequence>
           <xsd:element name="documentManagement">
             <xsd:complexType>
-              <xsd:all/>
+              <xsd:all>
+                <xsd:element ref="ns2:MediaServiceMetadata" minOccurs="0"/>
+                <xsd:element ref="ns2:MediaServiceFastMetadata" minOccurs="0"/>
+              </xsd:all>
             </xsd:complexType>
           </xsd:element>
         </xsd:sequence>
       </xsd:complexType>
+    </xsd:element>
+  </xsd:schema>
+  <xsd:schema xmlns:xsd="http://www.w3.org/2001/XMLSchema" xmlns:xs="http://www.w3.org/2001/XMLSchema" xmlns:dms="http://schemas.microsoft.com/office/2006/documentManagement/types" xmlns:pc="http://schemas.microsoft.com/office/infopath/2007/PartnerControls" targetNamespace="35490fb0-488e-45f4-b3a6-635ff1ba56af" elementFormDefault="qualified">
+    <xsd:import namespace="http://schemas.microsoft.com/office/2006/documentManagement/types"/>
+    <xsd:import namespace="http://schemas.microsoft.com/office/infopath/2007/PartnerControls"/>
+    <xsd:element name="MediaServiceMetadata" ma:index="8" nillable="true" ma:displayName="MediaServiceMetadata" ma:hidden="true" ma:internalName="MediaServiceMetadata" ma:readOnly="true">
+      <xsd:simpleType>
+        <xsd:restriction base="dms:Note"/>
+      </xsd:simpleType>
+    </xsd:element>
+    <xsd:element name="MediaServiceFastMetadata" ma:index="9" nillable="true" ma:displayName="MediaServiceFastMetadata" ma:hidden="true" ma:internalName="MediaServiceFastMetadata" ma:readOnly="true">
+      <xsd:simpleType>
+        <xsd:restriction base="dms:Note"/>
+      </xsd:simpleType>
     </xsd:element>
   </xsd:schema>
   <xsd:schema xmlns="http://schemas.openxmlformats.org/package/2006/metadata/core-properties" xmlns:xsd="http://www.w3.org/2001/XMLSchema" xmlns:xsi="http://www.w3.org/2001/XMLSchema-instance" xmlns:dc="http://purl.org/dc/elements/1.1/" xmlns:dcterms="http://purl.org/dc/terms/" xmlns:odoc="http://schemas.microsoft.com/internal/obd" targetNamespace="http://schemas.openxmlformats.org/package/2006/metadata/core-properties" elementFormDefault="qualified" attributeFormDefault="unqualified" blockDefault="#all">
@@ -8865,7 +8883,7 @@
 </file>
 
 <file path=customXml/itemProps1.xml><?xml version="1.0" encoding="utf-8"?>
-<ds:datastoreItem xmlns:ds="http://schemas.openxmlformats.org/officeDocument/2006/customXml" ds:itemID="{008A9D5D-3086-450A-B4D8-BC419D8D88AF}"/>
+<ds:datastoreItem xmlns:ds="http://schemas.openxmlformats.org/officeDocument/2006/customXml" ds:itemID="{5210DA29-DB20-4033-82A9-9CDD18BCFB2A}"/>
 </file>
 
 <file path=customXml/itemProps2.xml><?xml version="1.0" encoding="utf-8"?>

</xml_diff>